<commit_message>
polymers class activity 2
</commit_message>
<xml_diff>
--- a/3a.1.PlasticsAndCompositesEngineering/5_ClassActivity/2_Class Activity_06.07.2020_team2.pptx
+++ b/3a.1.PlasticsAndCompositesEngineering/5_ClassActivity/2_Class Activity_06.07.2020_team2.pptx
@@ -174,6 +174,7 @@
 <file path=ppt/revisionInfo.xml><?xml version="1.0" encoding="utf-8"?>
 <p1510:revInfo xmlns:a="http://schemas.openxmlformats.org/drawingml/2006/main" xmlns:r="http://schemas.openxmlformats.org/officeDocument/2006/relationships" xmlns:p1510="http://schemas.microsoft.com/office/powerpoint/2015/10/main">
   <p1510:revLst>
+    <p1510:client id="{01F8087D-ABBD-2F19-C88E-4C4403FB6658}" v="13" dt="2020-07-07T22:02:32.717"/>
     <p1510:client id="{0C436939-5DEA-A61A-B6DA-B3EBA6433A08}" v="48" dt="2020-07-07T17:14:00.243"/>
     <p1510:client id="{1E83AF17-B86E-4C19-9585-AD3B0B02D326}" v="369" dt="2020-07-07T15:42:30.818"/>
     <p1510:client id="{537A1ECF-6847-CC0B-8CD1-6EAC8C52B1E1}" v="12" dt="2020-07-07T16:52:22.733"/>
@@ -410,6 +411,30 @@
             <ac:picMk id="13" creationId="{8578D0BD-CD2C-44B1-976E-1029D186D2DF}"/>
           </ac:picMkLst>
         </pc:picChg>
+      </pc:sldChg>
+    </pc:docChg>
+  </pc:docChgLst>
+  <pc:docChgLst>
+    <pc:chgData name="Guest User" userId="S::urn:spo:anon#47e46a85d04db472c28c4aeb3bb64066e5c98df06a20401cfe8bdeac802351a8::" providerId="AD" clId="Web-{01F8087D-ABBD-2F19-C88E-4C4403FB6658}"/>
+    <pc:docChg chg="modSld">
+      <pc:chgData name="Guest User" userId="S::urn:spo:anon#47e46a85d04db472c28c4aeb3bb64066e5c98df06a20401cfe8bdeac802351a8::" providerId="AD" clId="Web-{01F8087D-ABBD-2F19-C88E-4C4403FB6658}" dt="2020-07-07T22:02:32.717" v="12" actId="14100"/>
+      <pc:docMkLst>
+        <pc:docMk/>
+      </pc:docMkLst>
+      <pc:sldChg chg="modSp">
+        <pc:chgData name="Guest User" userId="S::urn:spo:anon#47e46a85d04db472c28c4aeb3bb64066e5c98df06a20401cfe8bdeac802351a8::" providerId="AD" clId="Web-{01F8087D-ABBD-2F19-C88E-4C4403FB6658}" dt="2020-07-07T22:02:32.717" v="12" actId="14100"/>
+        <pc:sldMkLst>
+          <pc:docMk/>
+          <pc:sldMk cId="708711930" sldId="276"/>
+        </pc:sldMkLst>
+        <pc:spChg chg="mod">
+          <ac:chgData name="Guest User" userId="S::urn:spo:anon#47e46a85d04db472c28c4aeb3bb64066e5c98df06a20401cfe8bdeac802351a8::" providerId="AD" clId="Web-{01F8087D-ABBD-2F19-C88E-4C4403FB6658}" dt="2020-07-07T22:02:32.717" v="12" actId="14100"/>
+          <ac:spMkLst>
+            <pc:docMk/>
+            <pc:sldMk cId="708711930" sldId="276"/>
+            <ac:spMk id="7" creationId="{43F915F1-9C90-4B6E-AA0B-C9F4FCF704FA}"/>
+          </ac:spMkLst>
+        </pc:spChg>
       </pc:sldChg>
     </pc:docChg>
   </pc:docChgLst>
@@ -2581,7 +2606,7 @@
           <a:p>
             <a:fld id="{B3A8F86A-A3D1-4706-9131-90E1724D7948}" type="slidenum">
               <a:rPr lang="en-GB" smtClean="0"/>
-              <a:t>6</a:t>
+              <a:t>5</a:t>
             </a:fld>
             <a:endParaRPr lang="en-GB"/>
           </a:p>
@@ -8081,7 +8106,7 @@
           </a:lstStyle>
           <a:p>
             <a:r>
-              <a:rPr lang="en-GB">
+              <a:rPr lang="en-GB" dirty="0">
                 <a:solidFill>
                   <a:schemeClr val="bg1"/>
                 </a:solidFill>
@@ -8091,7 +8116,7 @@
               <a:t>Literature demonstrates that Gel-</a:t>
             </a:r>
             <a:r>
-              <a:rPr lang="en-GB" err="1">
+              <a:rPr lang="en-GB" dirty="0" err="1">
                 <a:solidFill>
                   <a:schemeClr val="bg1"/>
                 </a:solidFill>
@@ -8101,17 +8126,17 @@
               <a:t>Alg</a:t>
             </a:r>
             <a:r>
-              <a:rPr lang="en-GB">
+              <a:rPr lang="en-GB" dirty="0">
                 <a:solidFill>
                   <a:schemeClr val="bg1"/>
                 </a:solidFill>
                 <a:ea typeface="+mn-lt"/>
                 <a:cs typeface="+mn-lt"/>
               </a:rPr>
-              <a:t> obtained its viscoelastic strain and elastic recovery properties and can be potentially used to design </a:t>
-            </a:r>
-            <a:r>
-              <a:rPr lang="en-US">
+              <a:t> obtained its viscoelastic strain and elastic recovery properties and can be potentially used to design </a:t>
+            </a:r>
+            <a:r>
+              <a:rPr lang="en-US" dirty="0">
                 <a:solidFill>
                   <a:schemeClr val="bg1"/>
                 </a:solidFill>
@@ -8121,7 +8146,7 @@
               <a:t>extracellular matrix </a:t>
             </a:r>
             <a:r>
-              <a:rPr lang="en-GB">
+              <a:rPr lang="en-GB" dirty="0">
                 <a:solidFill>
                   <a:schemeClr val="bg1"/>
                 </a:solidFill>
@@ -8130,7 +8155,7 @@
               </a:rPr>
               <a:t> mimicking hydrogels.</a:t>
             </a:r>
-            <a:endParaRPr lang="en-GB">
+            <a:endParaRPr lang="en-GB" dirty="0">
               <a:solidFill>
                 <a:schemeClr val="bg1"/>
               </a:solidFill>

</xml_diff>